<commit_message>
Removing some issue with the presentation
</commit_message>
<xml_diff>
--- a/Presentationdata.pptx
+++ b/Presentationdata.pptx
@@ -291,7 +291,7 @@
             <a:fld id="{1622557C-3518-433D-BEE7-05944CF3B400}" type="datetimeFigureOut">
               <a:rPr lang="en-US" smtClean="0"/>
               <a:pPr/>
-              <a:t>3/26/2022</a:t>
+              <a:t>3/27/2022</a:t>
             </a:fld>
             <a:endParaRPr lang="en-US"/>
           </a:p>
@@ -458,7 +458,7 @@
             <a:fld id="{1622557C-3518-433D-BEE7-05944CF3B400}" type="datetimeFigureOut">
               <a:rPr lang="en-US" smtClean="0"/>
               <a:pPr/>
-              <a:t>3/26/2022</a:t>
+              <a:t>3/27/2022</a:t>
             </a:fld>
             <a:endParaRPr lang="en-US"/>
           </a:p>
@@ -635,7 +635,7 @@
             <a:fld id="{1622557C-3518-433D-BEE7-05944CF3B400}" type="datetimeFigureOut">
               <a:rPr lang="en-US" smtClean="0"/>
               <a:pPr/>
-              <a:t>3/26/2022</a:t>
+              <a:t>3/27/2022</a:t>
             </a:fld>
             <a:endParaRPr lang="en-US"/>
           </a:p>
@@ -802,7 +802,7 @@
             <a:fld id="{1622557C-3518-433D-BEE7-05944CF3B400}" type="datetimeFigureOut">
               <a:rPr lang="en-US" smtClean="0"/>
               <a:pPr/>
-              <a:t>3/26/2022</a:t>
+              <a:t>3/27/2022</a:t>
             </a:fld>
             <a:endParaRPr lang="en-US"/>
           </a:p>
@@ -1045,7 +1045,7 @@
             <a:fld id="{1622557C-3518-433D-BEE7-05944CF3B400}" type="datetimeFigureOut">
               <a:rPr lang="en-US" smtClean="0"/>
               <a:pPr/>
-              <a:t>3/26/2022</a:t>
+              <a:t>3/27/2022</a:t>
             </a:fld>
             <a:endParaRPr lang="en-US"/>
           </a:p>
@@ -1330,7 +1330,7 @@
             <a:fld id="{1622557C-3518-433D-BEE7-05944CF3B400}" type="datetimeFigureOut">
               <a:rPr lang="en-US" smtClean="0"/>
               <a:pPr/>
-              <a:t>3/26/2022</a:t>
+              <a:t>3/27/2022</a:t>
             </a:fld>
             <a:endParaRPr lang="en-US"/>
           </a:p>
@@ -1749,7 +1749,7 @@
             <a:fld id="{1622557C-3518-433D-BEE7-05944CF3B400}" type="datetimeFigureOut">
               <a:rPr lang="en-US" smtClean="0"/>
               <a:pPr/>
-              <a:t>3/26/2022</a:t>
+              <a:t>3/27/2022</a:t>
             </a:fld>
             <a:endParaRPr lang="en-US"/>
           </a:p>
@@ -1864,7 +1864,7 @@
             <a:fld id="{1622557C-3518-433D-BEE7-05944CF3B400}" type="datetimeFigureOut">
               <a:rPr lang="en-US" smtClean="0"/>
               <a:pPr/>
-              <a:t>3/26/2022</a:t>
+              <a:t>3/27/2022</a:t>
             </a:fld>
             <a:endParaRPr lang="en-US"/>
           </a:p>
@@ -1956,7 +1956,7 @@
             <a:fld id="{1622557C-3518-433D-BEE7-05944CF3B400}" type="datetimeFigureOut">
               <a:rPr lang="en-US" smtClean="0"/>
               <a:pPr/>
-              <a:t>3/26/2022</a:t>
+              <a:t>3/27/2022</a:t>
             </a:fld>
             <a:endParaRPr lang="en-US"/>
           </a:p>
@@ -2230,7 +2230,7 @@
             <a:fld id="{1622557C-3518-433D-BEE7-05944CF3B400}" type="datetimeFigureOut">
               <a:rPr lang="en-US" smtClean="0"/>
               <a:pPr/>
-              <a:t>3/26/2022</a:t>
+              <a:t>3/27/2022</a:t>
             </a:fld>
             <a:endParaRPr lang="en-US"/>
           </a:p>
@@ -2480,7 +2480,7 @@
             <a:fld id="{1622557C-3518-433D-BEE7-05944CF3B400}" type="datetimeFigureOut">
               <a:rPr lang="en-US" smtClean="0"/>
               <a:pPr/>
-              <a:t>3/26/2022</a:t>
+              <a:t>3/27/2022</a:t>
             </a:fld>
             <a:endParaRPr lang="en-US"/>
           </a:p>
@@ -2690,7 +2690,7 @@
             <a:fld id="{1622557C-3518-433D-BEE7-05944CF3B400}" type="datetimeFigureOut">
               <a:rPr lang="en-US" smtClean="0"/>
               <a:pPr/>
-              <a:t>3/26/2022</a:t>
+              <a:t>3/27/2022</a:t>
             </a:fld>
             <a:endParaRPr lang="en-US"/>
           </a:p>
@@ -3151,7 +3151,7 @@
                       <a:pPr algn="l"/>
                       <a:r>
                         <a:rPr lang="en-US" dirty="0" smtClean="0"/>
-                        <a:t>Password</a:t>
+                        <a:t>brilliant</a:t>
                       </a:r>
                       <a:endParaRPr lang="en-US" dirty="0"/>
                     </a:p>
@@ -4612,7 +4612,7 @@
                       </a:r>
                       <a:r>
                         <a:rPr lang="en-US" dirty="0" smtClean="0"/>
-                        <a:t>-password</a:t>
+                        <a:t>-brilliant</a:t>
                       </a:r>
                       <a:endParaRPr lang="en-US" dirty="0"/>
                     </a:p>
@@ -5086,7 +5086,7 @@
                       </a:r>
                       <a:r>
                         <a:rPr lang="en-US" dirty="0" smtClean="0"/>
-                        <a:t>-password</a:t>
+                        <a:t>-brilliant</a:t>
                       </a:r>
                       <a:endParaRPr lang="en-US" dirty="0"/>
                     </a:p>
@@ -6536,8 +6536,59 @@
                     <a:lstStyle/>
                     <a:p>
                       <a:r>
+                        <a:rPr lang="en-US" dirty="0" smtClean="0"/>
+                        <a:t>Nadia</a:t>
+                      </a:r>
+                      <a:endParaRPr lang="en-US" dirty="0"/>
+                    </a:p>
+                  </a:txBody>
+                  <a:tcPr>
+                    <a:lnL w="12700" cap="flat" cmpd="sng" algn="ctr">
+                      <a:solidFill>
+                        <a:schemeClr val="tx1"/>
+                      </a:solidFill>
+                      <a:prstDash val="solid"/>
+                      <a:round/>
+                      <a:headEnd type="none" w="med" len="med"/>
+                      <a:tailEnd type="none" w="med" len="med"/>
+                    </a:lnL>
+                    <a:lnR w="12700" cap="flat" cmpd="sng" algn="ctr">
+                      <a:solidFill>
+                        <a:schemeClr val="tx1"/>
+                      </a:solidFill>
+                      <a:prstDash val="solid"/>
+                      <a:round/>
+                      <a:headEnd type="none" w="med" len="med"/>
+                      <a:tailEnd type="none" w="med" len="med"/>
+                    </a:lnR>
+                    <a:lnT w="12700" cap="flat" cmpd="sng" algn="ctr">
+                      <a:solidFill>
+                        <a:schemeClr val="tx1"/>
+                      </a:solidFill>
+                      <a:prstDash val="solid"/>
+                      <a:round/>
+                      <a:headEnd type="none" w="med" len="med"/>
+                      <a:tailEnd type="none" w="med" len="med"/>
+                    </a:lnT>
+                    <a:lnB w="12700" cap="flat" cmpd="sng" algn="ctr">
+                      <a:solidFill>
+                        <a:schemeClr val="tx1"/>
+                      </a:solidFill>
+                      <a:prstDash val="solid"/>
+                      <a:round/>
+                      <a:headEnd type="none" w="med" len="med"/>
+                      <a:tailEnd type="none" w="med" len="med"/>
+                    </a:lnB>
+                  </a:tcPr>
+                </a:tc>
+                <a:tc>
+                  <a:txBody>
+                    <a:bodyPr/>
+                    <a:lstStyle/>
+                    <a:p>
+                      <a:r>
                         <a:rPr lang="en-US" dirty="0" err="1" smtClean="0"/>
-                        <a:t>Sadia</a:t>
+                        <a:t>NadiaThe-Noob</a:t>
                       </a:r>
                       <a:endParaRPr lang="en-US" dirty="0"/>
                     </a:p>
@@ -6587,59 +6638,8 @@
                     <a:lstStyle/>
                     <a:p>
                       <a:r>
-                        <a:rPr lang="en-US" dirty="0" err="1" smtClean="0"/>
-                        <a:t>sadiaThe-Noob</a:t>
-                      </a:r>
-                      <a:endParaRPr lang="en-US" dirty="0"/>
-                    </a:p>
-                  </a:txBody>
-                  <a:tcPr>
-                    <a:lnL w="12700" cap="flat" cmpd="sng" algn="ctr">
-                      <a:solidFill>
-                        <a:schemeClr val="tx1"/>
-                      </a:solidFill>
-                      <a:prstDash val="solid"/>
-                      <a:round/>
-                      <a:headEnd type="none" w="med" len="med"/>
-                      <a:tailEnd type="none" w="med" len="med"/>
-                    </a:lnL>
-                    <a:lnR w="12700" cap="flat" cmpd="sng" algn="ctr">
-                      <a:solidFill>
-                        <a:schemeClr val="tx1"/>
-                      </a:solidFill>
-                      <a:prstDash val="solid"/>
-                      <a:round/>
-                      <a:headEnd type="none" w="med" len="med"/>
-                      <a:tailEnd type="none" w="med" len="med"/>
-                    </a:lnR>
-                    <a:lnT w="12700" cap="flat" cmpd="sng" algn="ctr">
-                      <a:solidFill>
-                        <a:schemeClr val="tx1"/>
-                      </a:solidFill>
-                      <a:prstDash val="solid"/>
-                      <a:round/>
-                      <a:headEnd type="none" w="med" len="med"/>
-                      <a:tailEnd type="none" w="med" len="med"/>
-                    </a:lnT>
-                    <a:lnB w="12700" cap="flat" cmpd="sng" algn="ctr">
-                      <a:solidFill>
-                        <a:schemeClr val="tx1"/>
-                      </a:solidFill>
-                      <a:prstDash val="solid"/>
-                      <a:round/>
-                      <a:headEnd type="none" w="med" len="med"/>
-                      <a:tailEnd type="none" w="med" len="med"/>
-                    </a:lnB>
-                  </a:tcPr>
-                </a:tc>
-                <a:tc>
-                  <a:txBody>
-                    <a:bodyPr/>
-                    <a:lstStyle/>
-                    <a:p>
-                      <a:r>
-                        <a:rPr lang="en-US" dirty="0" err="1" smtClean="0"/>
-                        <a:t>Sadia</a:t>
+                        <a:rPr lang="en-US" dirty="0" smtClean="0"/>
+                        <a:t>Nadia</a:t>
                       </a:r>
                       <a:endParaRPr lang="en-US" dirty="0"/>
                     </a:p>
@@ -6743,7 +6743,7 @@
                         <a:rPr lang="en-US" dirty="0" smtClean="0">
                           <a:hlinkClick r:id="rId7"/>
                         </a:rPr>
-                        <a:t>sadia@gmail.com</a:t>
+                        <a:t>Nadia@gmail.com</a:t>
                       </a:r>
                       <a:endParaRPr lang="en-US" dirty="0"/>
                     </a:p>
@@ -7026,8 +7026,59 @@
                     <a:lstStyle/>
                     <a:p>
                       <a:r>
+                        <a:rPr lang="en-US" dirty="0" smtClean="0"/>
+                        <a:t>Nadia</a:t>
+                      </a:r>
+                      <a:endParaRPr lang="en-US" dirty="0"/>
+                    </a:p>
+                  </a:txBody>
+                  <a:tcPr>
+                    <a:lnL w="12700" cap="flat" cmpd="sng" algn="ctr">
+                      <a:solidFill>
+                        <a:schemeClr val="tx1"/>
+                      </a:solidFill>
+                      <a:prstDash val="solid"/>
+                      <a:round/>
+                      <a:headEnd type="none" w="med" len="med"/>
+                      <a:tailEnd type="none" w="med" len="med"/>
+                    </a:lnL>
+                    <a:lnR w="12700" cap="flat" cmpd="sng" algn="ctr">
+                      <a:solidFill>
+                        <a:schemeClr val="tx1"/>
+                      </a:solidFill>
+                      <a:prstDash val="solid"/>
+                      <a:round/>
+                      <a:headEnd type="none" w="med" len="med"/>
+                      <a:tailEnd type="none" w="med" len="med"/>
+                    </a:lnR>
+                    <a:lnT w="12700" cap="flat" cmpd="sng" algn="ctr">
+                      <a:solidFill>
+                        <a:schemeClr val="tx1"/>
+                      </a:solidFill>
+                      <a:prstDash val="solid"/>
+                      <a:round/>
+                      <a:headEnd type="none" w="med" len="med"/>
+                      <a:tailEnd type="none" w="med" len="med"/>
+                    </a:lnT>
+                    <a:lnB w="12700" cap="flat" cmpd="sng" algn="ctr">
+                      <a:solidFill>
+                        <a:schemeClr val="tx1"/>
+                      </a:solidFill>
+                      <a:prstDash val="solid"/>
+                      <a:round/>
+                      <a:headEnd type="none" w="med" len="med"/>
+                      <a:tailEnd type="none" w="med" len="med"/>
+                    </a:lnB>
+                  </a:tcPr>
+                </a:tc>
+                <a:tc>
+                  <a:txBody>
+                    <a:bodyPr/>
+                    <a:lstStyle/>
+                    <a:p>
+                      <a:r>
                         <a:rPr lang="en-US" dirty="0" err="1" smtClean="0"/>
-                        <a:t>Sadia</a:t>
+                        <a:t>NadiaThe-Noob</a:t>
                       </a:r>
                       <a:endParaRPr lang="en-US" dirty="0"/>
                     </a:p>
@@ -7077,59 +7128,8 @@
                     <a:lstStyle/>
                     <a:p>
                       <a:r>
-                        <a:rPr lang="en-US" dirty="0" err="1" smtClean="0"/>
-                        <a:t>sadiaThe-Noob</a:t>
-                      </a:r>
-                      <a:endParaRPr lang="en-US" dirty="0"/>
-                    </a:p>
-                  </a:txBody>
-                  <a:tcPr>
-                    <a:lnL w="12700" cap="flat" cmpd="sng" algn="ctr">
-                      <a:solidFill>
-                        <a:schemeClr val="tx1"/>
-                      </a:solidFill>
-                      <a:prstDash val="solid"/>
-                      <a:round/>
-                      <a:headEnd type="none" w="med" len="med"/>
-                      <a:tailEnd type="none" w="med" len="med"/>
-                    </a:lnL>
-                    <a:lnR w="12700" cap="flat" cmpd="sng" algn="ctr">
-                      <a:solidFill>
-                        <a:schemeClr val="tx1"/>
-                      </a:solidFill>
-                      <a:prstDash val="solid"/>
-                      <a:round/>
-                      <a:headEnd type="none" w="med" len="med"/>
-                      <a:tailEnd type="none" w="med" len="med"/>
-                    </a:lnR>
-                    <a:lnT w="12700" cap="flat" cmpd="sng" algn="ctr">
-                      <a:solidFill>
-                        <a:schemeClr val="tx1"/>
-                      </a:solidFill>
-                      <a:prstDash val="solid"/>
-                      <a:round/>
-                      <a:headEnd type="none" w="med" len="med"/>
-                      <a:tailEnd type="none" w="med" len="med"/>
-                    </a:lnT>
-                    <a:lnB w="12700" cap="flat" cmpd="sng" algn="ctr">
-                      <a:solidFill>
-                        <a:schemeClr val="tx1"/>
-                      </a:solidFill>
-                      <a:prstDash val="solid"/>
-                      <a:round/>
-                      <a:headEnd type="none" w="med" len="med"/>
-                      <a:tailEnd type="none" w="med" len="med"/>
-                    </a:lnB>
-                  </a:tcPr>
-                </a:tc>
-                <a:tc>
-                  <a:txBody>
-                    <a:bodyPr/>
-                    <a:lstStyle/>
-                    <a:p>
-                      <a:r>
-                        <a:rPr lang="en-US" dirty="0" err="1" smtClean="0"/>
-                        <a:t>Sadia</a:t>
+                        <a:rPr lang="en-US" dirty="0" smtClean="0"/>
+                        <a:t>Nadia</a:t>
                       </a:r>
                       <a:endParaRPr lang="en-US" dirty="0"/>
                     </a:p>
@@ -7233,7 +7233,7 @@
                         <a:rPr lang="en-US" dirty="0" smtClean="0">
                           <a:hlinkClick r:id="rId7"/>
                         </a:rPr>
-                        <a:t>sadia@gmail.com</a:t>
+                        <a:t>Nadia@gmail.com</a:t>
                       </a:r>
                       <a:endParaRPr lang="en-US" dirty="0"/>
                     </a:p>
@@ -8583,7 +8583,11 @@
                     <a:p>
                       <a:r>
                         <a:rPr lang="en-US" dirty="0" err="1" smtClean="0"/>
-                        <a:t>PraptiIs-NotRubel</a:t>
+                        <a:t>PraptiIs</a:t>
+                      </a:r>
+                      <a:r>
+                        <a:rPr lang="en-US" dirty="0" smtClean="0"/>
+                        <a:t>-bad</a:t>
                       </a:r>
                       <a:endParaRPr lang="en-US" dirty="0"/>
                     </a:p>
@@ -9066,7 +9070,11 @@
                     <a:p>
                       <a:r>
                         <a:rPr lang="en-US" dirty="0" err="1" smtClean="0"/>
-                        <a:t>PraptiIs-NotRubel</a:t>
+                        <a:t>PraptiIs</a:t>
+                      </a:r>
+                      <a:r>
+                        <a:rPr lang="en-US" dirty="0" smtClean="0"/>
+                        <a:t>-bad</a:t>
                       </a:r>
                       <a:endParaRPr lang="en-US" dirty="0"/>
                     </a:p>
@@ -9548,7 +9556,11 @@
                     <a:p>
                       <a:r>
                         <a:rPr lang="en-US" dirty="0" err="1" smtClean="0"/>
-                        <a:t>PraptiIs-NotRubel</a:t>
+                        <a:t>PraptiIs</a:t>
+                      </a:r>
+                      <a:r>
+                        <a:rPr lang="en-US" dirty="0" smtClean="0"/>
+                        <a:t>-bad</a:t>
                       </a:r>
                       <a:endParaRPr lang="en-US" dirty="0"/>
                     </a:p>
@@ -11382,7 +11394,7 @@
                         </a:spcAft>
                       </a:pPr>
                       <a:r>
-                        <a:rPr lang="en-US" sz="800" b="1" kern="1200">
+                        <a:rPr lang="en-US" sz="800" b="1" kern="1200" dirty="0" smtClean="0">
                           <a:solidFill>
                             <a:srgbClr val="FFFFFF"/>
                           </a:solidFill>
@@ -11390,9 +11402,9 @@
                           <a:ea typeface="Times New Roman"/>
                           <a:cs typeface="Calibri"/>
                         </a:rPr>
-                        <a:t>Password </a:t>
-                      </a:r>
-                      <a:endParaRPr lang="en-US" sz="600">
+                        <a:t>brilliant </a:t>
+                      </a:r>
+                      <a:endParaRPr lang="en-US" sz="600" dirty="0">
                         <a:latin typeface="Calibri"/>
                         <a:ea typeface="Times New Roman"/>
                         <a:cs typeface="Times New Roman"/>
@@ -13053,7 +13065,7 @@
                         </a:spcAft>
                       </a:pPr>
                       <a:r>
-                        <a:rPr lang="en-US" sz="800" kern="1200">
+                        <a:rPr lang="en-US" sz="800" kern="1200" dirty="0" err="1" smtClean="0">
                           <a:solidFill>
                             <a:srgbClr val="000000"/>
                           </a:solidFill>
@@ -13061,9 +13073,20 @@
                           <a:ea typeface="Times New Roman"/>
                           <a:cs typeface="Calibri"/>
                         </a:rPr>
-                        <a:t>keyaThe-password </a:t>
-                      </a:r>
-                      <a:endParaRPr lang="en-US" sz="600">
+                        <a:t>keyaThe</a:t>
+                      </a:r>
+                      <a:r>
+                        <a:rPr lang="en-US" sz="800" kern="1200" dirty="0" smtClean="0">
+                          <a:solidFill>
+                            <a:srgbClr val="000000"/>
+                          </a:solidFill>
+                          <a:latin typeface="Calibri"/>
+                          <a:ea typeface="Times New Roman"/>
+                          <a:cs typeface="Calibri"/>
+                        </a:rPr>
+                        <a:t>-Brilliant </a:t>
+                      </a:r>
+                      <a:endParaRPr lang="en-US" sz="600" dirty="0">
                         <a:latin typeface="Calibri"/>
                         <a:ea typeface="Times New Roman"/>
                         <a:cs typeface="Times New Roman"/>
@@ -14501,7 +14524,7 @@
                         </a:spcAft>
                       </a:pPr>
                       <a:r>
-                        <a:rPr lang="en-US" sz="800" kern="1200">
+                        <a:rPr lang="en-US" sz="800" kern="1200" dirty="0" smtClean="0">
                           <a:solidFill>
                             <a:srgbClr val="000000"/>
                           </a:solidFill>
@@ -14509,9 +14532,9 @@
                           <a:ea typeface="Times New Roman"/>
                           <a:cs typeface="Calibri"/>
                         </a:rPr>
-                        <a:t>Sadia </a:t>
-                      </a:r>
-                      <a:endParaRPr lang="en-US" sz="600">
+                        <a:t>Nadia </a:t>
+                      </a:r>
+                      <a:endParaRPr lang="en-US" sz="600" dirty="0">
                         <a:latin typeface="Calibri"/>
                         <a:ea typeface="Times New Roman"/>
                         <a:cs typeface="Times New Roman"/>
@@ -14574,7 +14597,7 @@
                         </a:spcAft>
                       </a:pPr>
                       <a:r>
-                        <a:rPr lang="en-US" sz="800" kern="1200">
+                        <a:rPr lang="en-US" sz="800" kern="1200" dirty="0" err="1">
                           <a:solidFill>
                             <a:srgbClr val="000000"/>
                           </a:solidFill>
@@ -14582,72 +14605,10 @@
                           <a:ea typeface="Times New Roman"/>
                           <a:cs typeface="Calibri"/>
                         </a:rPr>
-                        <a:t>sadiaThe-Noob </a:t>
-                      </a:r>
-                      <a:endParaRPr lang="en-US" sz="600">
-                        <a:latin typeface="Calibri"/>
-                        <a:ea typeface="Times New Roman"/>
-                        <a:cs typeface="Times New Roman"/>
-                      </a:endParaRPr>
-                    </a:p>
-                  </a:txBody>
-                  <a:tcPr marL="32547" marR="32547" marT="16273" marB="16273">
-                    <a:lnL w="12700" cap="flat" cmpd="sng" algn="ctr">
-                      <a:solidFill>
-                        <a:srgbClr val="000000"/>
-                      </a:solidFill>
-                      <a:prstDash val="solid"/>
-                      <a:round/>
-                      <a:headEnd type="none" w="med" len="med"/>
-                      <a:tailEnd type="none" w="med" len="med"/>
-                    </a:lnL>
-                    <a:lnR w="12700" cap="flat" cmpd="sng" algn="ctr">
-                      <a:solidFill>
-                        <a:srgbClr val="000000"/>
-                      </a:solidFill>
-                      <a:prstDash val="solid"/>
-                      <a:round/>
-                      <a:headEnd type="none" w="med" len="med"/>
-                      <a:tailEnd type="none" w="med" len="med"/>
-                    </a:lnR>
-                    <a:lnT w="12700" cap="flat" cmpd="sng" algn="ctr">
-                      <a:solidFill>
-                        <a:srgbClr val="000000"/>
-                      </a:solidFill>
-                      <a:prstDash val="solid"/>
-                      <a:round/>
-                      <a:headEnd type="none" w="med" len="med"/>
-                      <a:tailEnd type="none" w="med" len="med"/>
-                    </a:lnT>
-                    <a:lnB w="12700" cap="flat" cmpd="sng" algn="ctr">
-                      <a:solidFill>
-                        <a:srgbClr val="000000"/>
-                      </a:solidFill>
-                      <a:prstDash val="solid"/>
-                      <a:round/>
-                      <a:headEnd type="none" w="med" len="med"/>
-                      <a:tailEnd type="none" w="med" len="med"/>
-                    </a:lnB>
-                  </a:tcPr>
-                </a:tc>
-                <a:tc>
-                  <a:txBody>
-                    <a:bodyPr/>
-                    <a:lstStyle/>
-                    <a:p>
-                      <a:pPr marL="0" marR="0">
-                        <a:lnSpc>
-                          <a:spcPct val="115000"/>
-                        </a:lnSpc>
-                        <a:spcBef>
-                          <a:spcPts val="0"/>
-                        </a:spcBef>
-                        <a:spcAft>
-                          <a:spcPts val="0"/>
-                        </a:spcAft>
-                      </a:pPr>
-                      <a:r>
-                        <a:rPr lang="en-US" sz="800" kern="1200">
+                        <a:t>N</a:t>
+                      </a:r>
+                      <a:r>
+                        <a:rPr lang="en-US" sz="800" kern="1200" dirty="0" err="1" smtClean="0">
                           <a:solidFill>
                             <a:srgbClr val="000000"/>
                           </a:solidFill>
@@ -14655,9 +14616,93 @@
                           <a:ea typeface="Times New Roman"/>
                           <a:cs typeface="Calibri"/>
                         </a:rPr>
-                        <a:t>Sadia </a:t>
-                      </a:r>
-                      <a:endParaRPr lang="en-US" sz="600">
+                        <a:t>adiaThe-Noob</a:t>
+                      </a:r>
+                      <a:r>
+                        <a:rPr lang="en-US" sz="800" kern="1200" dirty="0" smtClean="0">
+                          <a:solidFill>
+                            <a:srgbClr val="000000"/>
+                          </a:solidFill>
+                          <a:latin typeface="Calibri"/>
+                          <a:ea typeface="Times New Roman"/>
+                          <a:cs typeface="Calibri"/>
+                        </a:rPr>
+                        <a:t> </a:t>
+                      </a:r>
+                      <a:endParaRPr lang="en-US" sz="600" dirty="0">
+                        <a:latin typeface="Calibri"/>
+                        <a:ea typeface="Times New Roman"/>
+                        <a:cs typeface="Times New Roman"/>
+                      </a:endParaRPr>
+                    </a:p>
+                  </a:txBody>
+                  <a:tcPr marL="32547" marR="32547" marT="16273" marB="16273">
+                    <a:lnL w="12700" cap="flat" cmpd="sng" algn="ctr">
+                      <a:solidFill>
+                        <a:srgbClr val="000000"/>
+                      </a:solidFill>
+                      <a:prstDash val="solid"/>
+                      <a:round/>
+                      <a:headEnd type="none" w="med" len="med"/>
+                      <a:tailEnd type="none" w="med" len="med"/>
+                    </a:lnL>
+                    <a:lnR w="12700" cap="flat" cmpd="sng" algn="ctr">
+                      <a:solidFill>
+                        <a:srgbClr val="000000"/>
+                      </a:solidFill>
+                      <a:prstDash val="solid"/>
+                      <a:round/>
+                      <a:headEnd type="none" w="med" len="med"/>
+                      <a:tailEnd type="none" w="med" len="med"/>
+                    </a:lnR>
+                    <a:lnT w="12700" cap="flat" cmpd="sng" algn="ctr">
+                      <a:solidFill>
+                        <a:srgbClr val="000000"/>
+                      </a:solidFill>
+                      <a:prstDash val="solid"/>
+                      <a:round/>
+                      <a:headEnd type="none" w="med" len="med"/>
+                      <a:tailEnd type="none" w="med" len="med"/>
+                    </a:lnT>
+                    <a:lnB w="12700" cap="flat" cmpd="sng" algn="ctr">
+                      <a:solidFill>
+                        <a:srgbClr val="000000"/>
+                      </a:solidFill>
+                      <a:prstDash val="solid"/>
+                      <a:round/>
+                      <a:headEnd type="none" w="med" len="med"/>
+                      <a:tailEnd type="none" w="med" len="med"/>
+                    </a:lnB>
+                  </a:tcPr>
+                </a:tc>
+                <a:tc>
+                  <a:txBody>
+                    <a:bodyPr/>
+                    <a:lstStyle/>
+                    <a:p>
+                      <a:pPr marL="0" marR="0">
+                        <a:lnSpc>
+                          <a:spcPct val="115000"/>
+                        </a:lnSpc>
+                        <a:spcBef>
+                          <a:spcPts val="0"/>
+                        </a:spcBef>
+                        <a:spcAft>
+                          <a:spcPts val="0"/>
+                        </a:spcAft>
+                      </a:pPr>
+                      <a:r>
+                        <a:rPr lang="en-US" sz="800" kern="1200" dirty="0" smtClean="0">
+                          <a:solidFill>
+                            <a:srgbClr val="000000"/>
+                          </a:solidFill>
+                          <a:latin typeface="Calibri"/>
+                          <a:ea typeface="Times New Roman"/>
+                          <a:cs typeface="Calibri"/>
+                        </a:rPr>
+                        <a:t>Nadia </a:t>
+                      </a:r>
+                      <a:endParaRPr lang="en-US" sz="600" dirty="0">
                         <a:latin typeface="Calibri"/>
                         <a:ea typeface="Times New Roman"/>
                         <a:cs typeface="Times New Roman"/>
@@ -14866,7 +14911,7 @@
                         </a:spcAft>
                       </a:pPr>
                       <a:r>
-                        <a:rPr lang="en-US" sz="800" u="sng" kern="1200">
+                        <a:rPr lang="en-US" sz="800" u="sng" kern="1200" dirty="0" smtClean="0">
                           <a:solidFill>
                             <a:srgbClr val="0000FF"/>
                           </a:solidFill>
@@ -14875,10 +14920,10 @@
                           <a:cs typeface="Calibri"/>
                           <a:hlinkClick r:id="rId7"/>
                         </a:rPr>
-                        <a:t>sadia@gmail.com</a:t>
-                      </a:r>
-                      <a:r>
-                        <a:rPr lang="en-US" sz="800" kern="1200">
+                        <a:t>Nadia@gmail.com</a:t>
+                      </a:r>
+                      <a:r>
+                        <a:rPr lang="en-US" sz="800" kern="1200" dirty="0" smtClean="0">
                           <a:solidFill>
                             <a:srgbClr val="000000"/>
                           </a:solidFill>
@@ -14888,7 +14933,7 @@
                         </a:rPr>
                         <a:t> </a:t>
                       </a:r>
-                      <a:endParaRPr lang="en-US" sz="600">
+                      <a:endParaRPr lang="en-US" sz="600" dirty="0">
                         <a:latin typeface="Calibri"/>
                         <a:ea typeface="Times New Roman"/>
                         <a:cs typeface="Times New Roman"/>
@@ -16106,7 +16151,7 @@
                         </a:spcAft>
                       </a:pPr>
                       <a:r>
-                        <a:rPr lang="en-US" sz="800" kern="1200">
+                        <a:rPr lang="en-US" sz="800" kern="1200" dirty="0" err="1" smtClean="0">
                           <a:solidFill>
                             <a:srgbClr val="000000"/>
                           </a:solidFill>
@@ -16114,9 +16159,20 @@
                           <a:ea typeface="Times New Roman"/>
                           <a:cs typeface="Calibri"/>
                         </a:rPr>
-                        <a:t>PraptiIs-NotRubel </a:t>
-                      </a:r>
-                      <a:endParaRPr lang="en-US" sz="600">
+                        <a:t>PraptiIs</a:t>
+                      </a:r>
+                      <a:r>
+                        <a:rPr lang="en-US" sz="800" kern="1200" dirty="0" smtClean="0">
+                          <a:solidFill>
+                            <a:srgbClr val="000000"/>
+                          </a:solidFill>
+                          <a:latin typeface="Calibri"/>
+                          <a:ea typeface="Times New Roman"/>
+                          <a:cs typeface="Calibri"/>
+                        </a:rPr>
+                        <a:t>-bad</a:t>
+                      </a:r>
+                      <a:endParaRPr lang="en-US" sz="600" dirty="0">
                         <a:latin typeface="Calibri"/>
                         <a:ea typeface="Times New Roman"/>
                         <a:cs typeface="Times New Roman"/>
@@ -16260,9 +16316,20 @@
                           <a:ea typeface="Times New Roman"/>
                           <a:cs typeface="Calibri"/>
                         </a:rPr>
-                        <a:t>Sharkar </a:t>
-                      </a:r>
-                      <a:endParaRPr lang="en-US" sz="600">
+                        <a:t>Sharkar</a:t>
+                      </a:r>
+                      <a:r>
+                        <a:rPr lang="en-US" sz="800" kern="1200" dirty="0">
+                          <a:solidFill>
+                            <a:srgbClr val="000000"/>
+                          </a:solidFill>
+                          <a:latin typeface="Calibri"/>
+                          <a:ea typeface="Times New Roman"/>
+                          <a:cs typeface="Calibri"/>
+                        </a:rPr>
+                        <a:t> </a:t>
+                      </a:r>
+                      <a:endParaRPr lang="en-US" sz="600" dirty="0">
                         <a:latin typeface="Calibri"/>
                         <a:ea typeface="Times New Roman"/>
                         <a:cs typeface="Times New Roman"/>
@@ -16483,7 +16550,7 @@
                         </a:spcAft>
                       </a:pPr>
                       <a:r>
-                        <a:rPr lang="en-US" sz="800" kern="1200">
+                        <a:rPr lang="en-US" sz="800" kern="1200" dirty="0" err="1">
                           <a:solidFill>
                             <a:srgbClr val="000000"/>
                           </a:solidFill>
@@ -16491,9 +16558,20 @@
                           <a:ea typeface="Times New Roman"/>
                           <a:cs typeface="Calibri"/>
                         </a:rPr>
-                        <a:t>Dampara, Chittagong </a:t>
-                      </a:r>
-                      <a:endParaRPr lang="en-US" sz="600">
+                        <a:t>Dampara</a:t>
+                      </a:r>
+                      <a:r>
+                        <a:rPr lang="en-US" sz="800" kern="1200" dirty="0">
+                          <a:solidFill>
+                            <a:srgbClr val="000000"/>
+                          </a:solidFill>
+                          <a:latin typeface="Calibri"/>
+                          <a:ea typeface="Times New Roman"/>
+                          <a:cs typeface="Calibri"/>
+                        </a:rPr>
+                        <a:t>, Chittagong </a:t>
+                      </a:r>
+                      <a:endParaRPr lang="en-US" sz="600" dirty="0">
                         <a:latin typeface="Calibri"/>
                         <a:ea typeface="Times New Roman"/>
                         <a:cs typeface="Times New Roman"/>

</xml_diff>